<commit_message>
Moved materials to correct sessions, fixed fixed content links on schedule page
</commit_message>
<xml_diff>
--- a/docs/Program/Session3/2019UpdatedPygame.pptx
+++ b/docs/Program/Session3/2019UpdatedPygame.pptx
@@ -5,21 +5,20 @@
     <p:sldMasterId id="2147483725" r:id="rId1"/>
   </p:sldMasterIdLst>
   <p:notesMasterIdLst>
-    <p:notesMasterId r:id="rId14"/>
+    <p:notesMasterId r:id="rId13"/>
   </p:notesMasterIdLst>
   <p:sldIdLst>
     <p:sldId id="352" r:id="rId2"/>
-    <p:sldId id="349" r:id="rId3"/>
-    <p:sldId id="350" r:id="rId4"/>
-    <p:sldId id="351" r:id="rId5"/>
-    <p:sldId id="357" r:id="rId6"/>
-    <p:sldId id="346" r:id="rId7"/>
-    <p:sldId id="347" r:id="rId8"/>
-    <p:sldId id="355" r:id="rId9"/>
-    <p:sldId id="356" r:id="rId10"/>
-    <p:sldId id="344" r:id="rId11"/>
-    <p:sldId id="354" r:id="rId12"/>
-    <p:sldId id="348" r:id="rId13"/>
+    <p:sldId id="350" r:id="rId3"/>
+    <p:sldId id="351" r:id="rId4"/>
+    <p:sldId id="357" r:id="rId5"/>
+    <p:sldId id="346" r:id="rId6"/>
+    <p:sldId id="347" r:id="rId7"/>
+    <p:sldId id="355" r:id="rId8"/>
+    <p:sldId id="356" r:id="rId9"/>
+    <p:sldId id="344" r:id="rId10"/>
+    <p:sldId id="354" r:id="rId11"/>
+    <p:sldId id="348" r:id="rId12"/>
   </p:sldIdLst>
   <p:sldSz cx="9144000" cy="6858000" type="screen4x3"/>
   <p:notesSz cx="7023100" cy="9309100"/>
@@ -742,71 +741,68 @@
       </p:grpSpPr>
       <p:sp>
         <p:nvSpPr>
-          <p:cNvPr id="9218" name="Rectangle 7"/>
-          <p:cNvSpPr>
-            <a:spLocks noGrp="1" noChangeArrowheads="1"/>
-          </p:cNvSpPr>
-          <p:nvPr>
-            <p:ph type="sldNum" sz="quarter" idx="5"/>
-          </p:nvPr>
-        </p:nvSpPr>
-        <p:spPr>
-          <a:noFill/>
-        </p:spPr>
+          <p:cNvPr id="2" name="Slide Image Placeholder 1"/>
+          <p:cNvSpPr>
+            <a:spLocks noGrp="1" noRot="1" noChangeAspect="1"/>
+          </p:cNvSpPr>
+          <p:nvPr>
+            <p:ph type="sldImg"/>
+          </p:nvPr>
+        </p:nvSpPr>
+        <p:spPr/>
+      </p:sp>
+      <p:sp>
+        <p:nvSpPr>
+          <p:cNvPr id="3" name="Notes Placeholder 2"/>
+          <p:cNvSpPr>
+            <a:spLocks noGrp="1"/>
+          </p:cNvSpPr>
+          <p:nvPr>
+            <p:ph type="body" idx="1"/>
+          </p:nvPr>
+        </p:nvSpPr>
+        <p:spPr/>
         <p:txBody>
           <a:bodyPr/>
           <a:lstStyle/>
           <a:p>
-            <a:fld id="{C1B1C69B-C3C9-48BF-A85A-077FA2E7637A}" type="slidenum">
-              <a:rPr lang="en-US" smtClean="0"/>
-              <a:pPr/>
-              <a:t>2</a:t>
-            </a:fld>
-            <a:endParaRPr lang="en-US" smtClean="0"/>
-          </a:p>
-        </p:txBody>
-      </p:sp>
-      <p:sp>
-        <p:nvSpPr>
-          <p:cNvPr id="9219" name="Rectangle 2"/>
-          <p:cNvSpPr>
-            <a:spLocks noGrp="1" noRot="1" noChangeAspect="1" noChangeArrowheads="1" noTextEdit="1"/>
-          </p:cNvSpPr>
-          <p:nvPr>
-            <p:ph type="sldImg"/>
-          </p:nvPr>
-        </p:nvSpPr>
-        <p:spPr>
-          <a:ln/>
-        </p:spPr>
-      </p:sp>
-      <p:sp>
-        <p:nvSpPr>
-          <p:cNvPr id="9220" name="Rectangle 3"/>
-          <p:cNvSpPr>
-            <a:spLocks noGrp="1" noChangeArrowheads="1"/>
-          </p:cNvSpPr>
-          <p:nvPr>
-            <p:ph type="body" idx="1"/>
-          </p:nvPr>
-        </p:nvSpPr>
-        <p:spPr>
-          <a:noFill/>
-          <a:ln/>
-        </p:spPr>
+            <a:endParaRPr lang="en-US" dirty="0"/>
+          </a:p>
+        </p:txBody>
+      </p:sp>
+      <p:sp>
+        <p:nvSpPr>
+          <p:cNvPr id="4" name="Slide Number Placeholder 3"/>
+          <p:cNvSpPr>
+            <a:spLocks noGrp="1"/>
+          </p:cNvSpPr>
+          <p:nvPr>
+            <p:ph type="sldNum" sz="quarter" idx="10"/>
+          </p:nvPr>
+        </p:nvSpPr>
+        <p:spPr/>
         <p:txBody>
           <a:bodyPr/>
           <a:lstStyle/>
           <a:p>
-            <a:pPr eaLnBrk="1" hangingPunct="1"/>
-            <a:endParaRPr lang="en-US" smtClean="0"/>
+            <a:pPr>
+              <a:defRPr/>
+            </a:pPr>
+            <a:fld id="{4071C0C9-2BA1-4722-B522-D98858E51F08}" type="slidenum">
+              <a:rPr lang="en-US" smtClean="0"/>
+              <a:pPr>
+                <a:defRPr/>
+              </a:pPr>
+              <a:t>3</a:t>
+            </a:fld>
+            <a:endParaRPr lang="en-US"/>
           </a:p>
         </p:txBody>
       </p:sp>
     </p:spTree>
     <p:extLst>
       <p:ext uri="{BB962C8B-B14F-4D97-AF65-F5344CB8AC3E}">
-        <p14:creationId xmlns:p14="http://schemas.microsoft.com/office/powerpoint/2010/main" val="1046025697"/>
+        <p14:creationId xmlns:p14="http://schemas.microsoft.com/office/powerpoint/2010/main" val="2908772202"/>
       </p:ext>
     </p:extLst>
   </p:cSld>
@@ -835,68 +831,71 @@
       </p:grpSpPr>
       <p:sp>
         <p:nvSpPr>
-          <p:cNvPr id="2" name="Slide Image Placeholder 1"/>
-          <p:cNvSpPr>
-            <a:spLocks noGrp="1" noRot="1" noChangeAspect="1"/>
-          </p:cNvSpPr>
-          <p:nvPr>
-            <p:ph type="sldImg"/>
-          </p:nvPr>
-        </p:nvSpPr>
-        <p:spPr/>
-      </p:sp>
-      <p:sp>
-        <p:nvSpPr>
-          <p:cNvPr id="3" name="Notes Placeholder 2"/>
-          <p:cNvSpPr>
-            <a:spLocks noGrp="1"/>
-          </p:cNvSpPr>
-          <p:nvPr>
-            <p:ph type="body" idx="1"/>
-          </p:nvPr>
-        </p:nvSpPr>
-        <p:spPr/>
+          <p:cNvPr id="10242" name="Rectangle 7"/>
+          <p:cNvSpPr>
+            <a:spLocks noGrp="1" noChangeArrowheads="1"/>
+          </p:cNvSpPr>
+          <p:nvPr>
+            <p:ph type="sldNum" sz="quarter" idx="5"/>
+          </p:nvPr>
+        </p:nvSpPr>
+        <p:spPr>
+          <a:noFill/>
+        </p:spPr>
         <p:txBody>
           <a:bodyPr/>
           <a:lstStyle/>
           <a:p>
-            <a:endParaRPr lang="en-US" dirty="0"/>
-          </a:p>
-        </p:txBody>
-      </p:sp>
-      <p:sp>
-        <p:nvSpPr>
-          <p:cNvPr id="4" name="Slide Number Placeholder 3"/>
-          <p:cNvSpPr>
-            <a:spLocks noGrp="1"/>
-          </p:cNvSpPr>
-          <p:nvPr>
-            <p:ph type="sldNum" sz="quarter" idx="10"/>
-          </p:nvPr>
-        </p:nvSpPr>
-        <p:spPr/>
+            <a:fld id="{6979AC8F-7E54-4CB3-831D-41030F92D100}" type="slidenum">
+              <a:rPr lang="en-US" smtClean="0"/>
+              <a:pPr/>
+              <a:t>5</a:t>
+            </a:fld>
+            <a:endParaRPr lang="en-US" smtClean="0"/>
+          </a:p>
+        </p:txBody>
+      </p:sp>
+      <p:sp>
+        <p:nvSpPr>
+          <p:cNvPr id="10243" name="Rectangle 2"/>
+          <p:cNvSpPr>
+            <a:spLocks noGrp="1" noRot="1" noChangeAspect="1" noChangeArrowheads="1" noTextEdit="1"/>
+          </p:cNvSpPr>
+          <p:nvPr>
+            <p:ph type="sldImg"/>
+          </p:nvPr>
+        </p:nvSpPr>
+        <p:spPr>
+          <a:ln/>
+        </p:spPr>
+      </p:sp>
+      <p:sp>
+        <p:nvSpPr>
+          <p:cNvPr id="10244" name="Rectangle 3"/>
+          <p:cNvSpPr>
+            <a:spLocks noGrp="1" noChangeArrowheads="1"/>
+          </p:cNvSpPr>
+          <p:nvPr>
+            <p:ph type="body" idx="1"/>
+          </p:nvPr>
+        </p:nvSpPr>
+        <p:spPr>
+          <a:noFill/>
+          <a:ln/>
+        </p:spPr>
         <p:txBody>
           <a:bodyPr/>
           <a:lstStyle/>
           <a:p>
-            <a:pPr>
-              <a:defRPr/>
-            </a:pPr>
-            <a:fld id="{4071C0C9-2BA1-4722-B522-D98858E51F08}" type="slidenum">
-              <a:rPr lang="en-US" smtClean="0"/>
-              <a:pPr>
-                <a:defRPr/>
-              </a:pPr>
-              <a:t>4</a:t>
-            </a:fld>
-            <a:endParaRPr lang="en-US"/>
+            <a:pPr eaLnBrk="1" hangingPunct="1"/>
+            <a:endParaRPr lang="en-US" smtClean="0"/>
           </a:p>
         </p:txBody>
       </p:sp>
     </p:spTree>
     <p:extLst>
       <p:ext uri="{BB962C8B-B14F-4D97-AF65-F5344CB8AC3E}">
-        <p14:creationId xmlns:p14="http://schemas.microsoft.com/office/powerpoint/2010/main" val="2908772202"/>
+        <p14:creationId xmlns:p14="http://schemas.microsoft.com/office/powerpoint/2010/main" val="1178873241"/>
       </p:ext>
     </p:extLst>
   </p:cSld>
@@ -925,7 +924,7 @@
       </p:grpSpPr>
       <p:sp>
         <p:nvSpPr>
-          <p:cNvPr id="10242" name="Rectangle 7"/>
+          <p:cNvPr id="11266" name="Rectangle 7"/>
           <p:cNvSpPr>
             <a:spLocks noGrp="1" noChangeArrowheads="1"/>
           </p:cNvSpPr>
@@ -940,7 +939,7 @@
           <a:bodyPr/>
           <a:lstStyle/>
           <a:p>
-            <a:fld id="{6979AC8F-7E54-4CB3-831D-41030F92D100}" type="slidenum">
+            <a:fld id="{591FE4EC-BCD7-4F4E-9EA1-0AFA1F886AAF}" type="slidenum">
               <a:rPr lang="en-US" smtClean="0"/>
               <a:pPr/>
               <a:t>6</a:t>
@@ -951,7 +950,7 @@
       </p:sp>
       <p:sp>
         <p:nvSpPr>
-          <p:cNvPr id="10243" name="Rectangle 2"/>
+          <p:cNvPr id="11267" name="Rectangle 2"/>
           <p:cNvSpPr>
             <a:spLocks noGrp="1" noRot="1" noChangeAspect="1" noChangeArrowheads="1" noTextEdit="1"/>
           </p:cNvSpPr>
@@ -965,7 +964,7 @@
       </p:sp>
       <p:sp>
         <p:nvSpPr>
-          <p:cNvPr id="10244" name="Rectangle 3"/>
+          <p:cNvPr id="11268" name="Rectangle 3"/>
           <p:cNvSpPr>
             <a:spLocks noGrp="1" noChangeArrowheads="1"/>
           </p:cNvSpPr>
@@ -989,7 +988,7 @@
     </p:spTree>
     <p:extLst>
       <p:ext uri="{BB962C8B-B14F-4D97-AF65-F5344CB8AC3E}">
-        <p14:creationId xmlns:p14="http://schemas.microsoft.com/office/powerpoint/2010/main" val="1178873241"/>
+        <p14:creationId xmlns:p14="http://schemas.microsoft.com/office/powerpoint/2010/main" val="3481869"/>
       </p:ext>
     </p:extLst>
   </p:cSld>
@@ -1018,7 +1017,7 @@
       </p:grpSpPr>
       <p:sp>
         <p:nvSpPr>
-          <p:cNvPr id="11266" name="Rectangle 7"/>
+          <p:cNvPr id="9218" name="Rectangle 7"/>
           <p:cNvSpPr>
             <a:spLocks noGrp="1" noChangeArrowheads="1"/>
           </p:cNvSpPr>
@@ -1033,10 +1032,10 @@
           <a:bodyPr/>
           <a:lstStyle/>
           <a:p>
-            <a:fld id="{591FE4EC-BCD7-4F4E-9EA1-0AFA1F886AAF}" type="slidenum">
+            <a:fld id="{C1B1C69B-C3C9-48BF-A85A-077FA2E7637A}" type="slidenum">
               <a:rPr lang="en-US" smtClean="0"/>
               <a:pPr/>
-              <a:t>7</a:t>
+              <a:t>9</a:t>
             </a:fld>
             <a:endParaRPr lang="en-US" smtClean="0"/>
           </a:p>
@@ -1044,7 +1043,7 @@
       </p:sp>
       <p:sp>
         <p:nvSpPr>
-          <p:cNvPr id="11267" name="Rectangle 2"/>
+          <p:cNvPr id="9219" name="Rectangle 2"/>
           <p:cNvSpPr>
             <a:spLocks noGrp="1" noRot="1" noChangeAspect="1" noChangeArrowheads="1" noTextEdit="1"/>
           </p:cNvSpPr>
@@ -1058,7 +1057,7 @@
       </p:sp>
       <p:sp>
         <p:nvSpPr>
-          <p:cNvPr id="11268" name="Rectangle 3"/>
+          <p:cNvPr id="9220" name="Rectangle 3"/>
           <p:cNvSpPr>
             <a:spLocks noGrp="1" noChangeArrowheads="1"/>
           </p:cNvSpPr>
@@ -1082,7 +1081,7 @@
     </p:spTree>
     <p:extLst>
       <p:ext uri="{BB962C8B-B14F-4D97-AF65-F5344CB8AC3E}">
-        <p14:creationId xmlns:p14="http://schemas.microsoft.com/office/powerpoint/2010/main" val="3481869"/>
+        <p14:creationId xmlns:p14="http://schemas.microsoft.com/office/powerpoint/2010/main" val="2784253836"/>
       </p:ext>
     </p:extLst>
   </p:cSld>
@@ -1111,99 +1110,6 @@
       </p:grpSpPr>
       <p:sp>
         <p:nvSpPr>
-          <p:cNvPr id="9218" name="Rectangle 7"/>
-          <p:cNvSpPr>
-            <a:spLocks noGrp="1" noChangeArrowheads="1"/>
-          </p:cNvSpPr>
-          <p:nvPr>
-            <p:ph type="sldNum" sz="quarter" idx="5"/>
-          </p:nvPr>
-        </p:nvSpPr>
-        <p:spPr>
-          <a:noFill/>
-        </p:spPr>
-        <p:txBody>
-          <a:bodyPr/>
-          <a:lstStyle/>
-          <a:p>
-            <a:fld id="{C1B1C69B-C3C9-48BF-A85A-077FA2E7637A}" type="slidenum">
-              <a:rPr lang="en-US" smtClean="0"/>
-              <a:pPr/>
-              <a:t>10</a:t>
-            </a:fld>
-            <a:endParaRPr lang="en-US" smtClean="0"/>
-          </a:p>
-        </p:txBody>
-      </p:sp>
-      <p:sp>
-        <p:nvSpPr>
-          <p:cNvPr id="9219" name="Rectangle 2"/>
-          <p:cNvSpPr>
-            <a:spLocks noGrp="1" noRot="1" noChangeAspect="1" noChangeArrowheads="1" noTextEdit="1"/>
-          </p:cNvSpPr>
-          <p:nvPr>
-            <p:ph type="sldImg"/>
-          </p:nvPr>
-        </p:nvSpPr>
-        <p:spPr>
-          <a:ln/>
-        </p:spPr>
-      </p:sp>
-      <p:sp>
-        <p:nvSpPr>
-          <p:cNvPr id="9220" name="Rectangle 3"/>
-          <p:cNvSpPr>
-            <a:spLocks noGrp="1" noChangeArrowheads="1"/>
-          </p:cNvSpPr>
-          <p:nvPr>
-            <p:ph type="body" idx="1"/>
-          </p:nvPr>
-        </p:nvSpPr>
-        <p:spPr>
-          <a:noFill/>
-          <a:ln/>
-        </p:spPr>
-        <p:txBody>
-          <a:bodyPr/>
-          <a:lstStyle/>
-          <a:p>
-            <a:pPr eaLnBrk="1" hangingPunct="1"/>
-            <a:endParaRPr lang="en-US" smtClean="0"/>
-          </a:p>
-        </p:txBody>
-      </p:sp>
-    </p:spTree>
-    <p:extLst>
-      <p:ext uri="{BB962C8B-B14F-4D97-AF65-F5344CB8AC3E}">
-        <p14:creationId xmlns:p14="http://schemas.microsoft.com/office/powerpoint/2010/main" val="2784253836"/>
-      </p:ext>
-    </p:extLst>
-  </p:cSld>
-  <p:clrMapOvr>
-    <a:masterClrMapping/>
-  </p:clrMapOvr>
-</p:notes>
-</file>
-
-<file path=ppt/notesSlides/notesSlide7.xml><?xml version="1.0" encoding="utf-8"?>
-<p:notes xmlns:a="http://schemas.openxmlformats.org/drawingml/2006/main" xmlns:r="http://schemas.openxmlformats.org/officeDocument/2006/relationships" xmlns:p="http://schemas.openxmlformats.org/presentationml/2006/main">
-  <p:cSld>
-    <p:spTree>
-      <p:nvGrpSpPr>
-        <p:cNvPr id="1" name=""/>
-        <p:cNvGrpSpPr/>
-        <p:nvPr/>
-      </p:nvGrpSpPr>
-      <p:grpSpPr>
-        <a:xfrm>
-          <a:off x="0" y="0"/>
-          <a:ext cx="0" cy="0"/>
-          <a:chOff x="0" y="0"/>
-          <a:chExt cx="0" cy="0"/>
-        </a:xfrm>
-      </p:grpSpPr>
-      <p:sp>
-        <p:nvSpPr>
           <p:cNvPr id="2" name="Slide Image Placeholder 1"/>
           <p:cNvSpPr>
             <a:spLocks noGrp="1" noRot="1" noChangeAspect="1"/>
@@ -1270,7 +1176,7 @@
               <a:pPr>
                 <a:defRPr/>
               </a:pPr>
-              <a:t>11</a:t>
+              <a:t>10</a:t>
             </a:fld>
             <a:endParaRPr lang="en-US"/>
           </a:p>
@@ -5935,8 +5841,12 @@
           <a:p>
             <a:pPr eaLnBrk="1" hangingPunct="1"/>
             <a:r>
-              <a:rPr lang="en-US" sz="4400" smtClean="0"/>
-              <a:t>Catapult 2018</a:t>
+              <a:rPr lang="en-US" sz="4400" dirty="0" smtClean="0"/>
+              <a:t>Catapult </a:t>
+            </a:r>
+            <a:r>
+              <a:rPr lang="en-US" sz="4400" dirty="0" smtClean="0"/>
+              <a:t>2019</a:t>
             </a:r>
             <a:endParaRPr lang="en-US" sz="1100" dirty="0" smtClean="0"/>
           </a:p>
@@ -6006,100 +5916,108 @@
       </p:grpSpPr>
       <p:sp>
         <p:nvSpPr>
-          <p:cNvPr id="4098" name="Rectangle 2"/>
-          <p:cNvSpPr>
-            <a:spLocks noGrp="1" noChangeArrowheads="1"/>
+          <p:cNvPr id="2" name="Title 1"/>
+          <p:cNvSpPr>
+            <a:spLocks noGrp="1"/>
           </p:cNvSpPr>
           <p:nvPr>
             <p:ph type="title"/>
           </p:nvPr>
         </p:nvSpPr>
-        <p:spPr>
-          <a:xfrm>
-            <a:off x="152400" y="228600"/>
-            <a:ext cx="7315200" cy="1036638"/>
-          </a:xfrm>
-        </p:spPr>
+        <p:spPr/>
         <p:txBody>
           <a:bodyPr/>
           <a:lstStyle/>
           <a:p>
-            <a:pPr eaLnBrk="1" hangingPunct="1"/>
-            <a:r>
-              <a:rPr lang="en-US" sz="4400" dirty="0" smtClean="0"/>
-              <a:t>Caution</a:t>
-            </a:r>
-            <a:endParaRPr lang="en-US" sz="1100" dirty="0" smtClean="0"/>
-          </a:p>
-        </p:txBody>
-      </p:sp>
-      <p:sp>
-        <p:nvSpPr>
-          <p:cNvPr id="4099" name="Rectangle 3"/>
-          <p:cNvSpPr>
-            <a:spLocks noGrp="1" noChangeArrowheads="1"/>
-          </p:cNvSpPr>
-          <p:nvPr>
-            <p:ph type="body" idx="1"/>
-          </p:nvPr>
-        </p:nvSpPr>
-        <p:spPr>
-          <a:xfrm>
-            <a:off x="381000" y="1752600"/>
-            <a:ext cx="7467600" cy="4876800"/>
-          </a:xfrm>
-        </p:spPr>
+            <a:r>
+              <a:rPr lang="en-US" dirty="0" smtClean="0"/>
+              <a:t>Things to Remember</a:t>
+            </a:r>
+            <a:endParaRPr lang="en-US" dirty="0"/>
+          </a:p>
+        </p:txBody>
+      </p:sp>
+      <p:sp>
+        <p:nvSpPr>
+          <p:cNvPr id="3" name="Content Placeholder 2"/>
+          <p:cNvSpPr>
+            <a:spLocks noGrp="1"/>
+          </p:cNvSpPr>
+          <p:nvPr>
+            <p:ph idx="1"/>
+          </p:nvPr>
+        </p:nvSpPr>
+        <p:spPr/>
         <p:txBody>
           <a:bodyPr/>
           <a:lstStyle/>
           <a:p>
-            <a:pPr eaLnBrk="1" hangingPunct="1"/>
-            <a:r>
-              <a:rPr lang="en-US" sz="2800" dirty="0" smtClean="0"/>
-              <a:t>At the end of your project, you’ll be given an opportunity to make a standalone (.exe) version of your project. For this to work, all pygame fonts that you </a:t>
-            </a:r>
-            <a:r>
-              <a:rPr lang="en-US" sz="2800" dirty="0"/>
-              <a:t>use </a:t>
-            </a:r>
-            <a:r>
-              <a:rPr lang="en-US" sz="2800" dirty="0" smtClean="0"/>
-              <a:t>should be </a:t>
-            </a:r>
-            <a:r>
-              <a:rPr lang="en-US" sz="2800" b="1" dirty="0" smtClean="0"/>
-              <a:t>SysFonts</a:t>
-            </a:r>
-            <a:r>
-              <a:rPr lang="en-US" sz="2800" dirty="0" smtClean="0"/>
-              <a:t> (created using pygame.font.SysFont) and the pygame default font should not be used [i.e. don’t use pygame.font.SysFont(None, 12)]</a:t>
-            </a:r>
-            <a:endParaRPr lang="en-US" sz="2800" dirty="0"/>
-          </a:p>
-          <a:p>
-            <a:pPr eaLnBrk="1" hangingPunct="1"/>
-            <a:r>
-              <a:rPr lang="en-US" sz="2800" dirty="0" smtClean="0"/>
-              <a:t>pygame.time keeps time in </a:t>
-            </a:r>
-            <a:r>
-              <a:rPr lang="en-US" sz="2800" b="1" dirty="0" smtClean="0"/>
-              <a:t>milliseconds</a:t>
-            </a:r>
-            <a:r>
-              <a:rPr lang="en-US" sz="2800" dirty="0" smtClean="0"/>
-              <a:t> not seconds</a:t>
-            </a:r>
-            <a:endParaRPr lang="en-US" sz="2400" dirty="0" smtClean="0"/>
+            <a:r>
+              <a:rPr lang="en-US" dirty="0"/>
+              <a:t>i</a:t>
+            </a:r>
+            <a:r>
+              <a:rPr lang="en-US" dirty="0" smtClean="0"/>
+              <a:t>mport </a:t>
+            </a:r>
+            <a:r>
+              <a:rPr lang="en-US" dirty="0" err="1" smtClean="0"/>
+              <a:t>pygame</a:t>
+            </a:r>
+            <a:endParaRPr lang="en-US" dirty="0" smtClean="0"/>
+          </a:p>
+          <a:p>
+            <a:r>
+              <a:rPr lang="en-US" dirty="0" smtClean="0"/>
+              <a:t>pygame.init()</a:t>
+            </a:r>
+          </a:p>
+          <a:p>
+            <a:r>
+              <a:rPr lang="en-US" dirty="0" smtClean="0"/>
+              <a:t>Must have event loop</a:t>
+            </a:r>
+          </a:p>
+          <a:p>
+            <a:r>
+              <a:rPr lang="en-US" dirty="0" err="1" smtClean="0"/>
+              <a:t>pygame.display.update</a:t>
+            </a:r>
+            <a:r>
+              <a:rPr lang="en-US" dirty="0" smtClean="0"/>
+              <a:t>() </a:t>
+            </a:r>
+            <a:endParaRPr lang="en-US" dirty="0"/>
+          </a:p>
+          <a:p>
+            <a:r>
+              <a:rPr lang="en-US" dirty="0" smtClean="0"/>
+              <a:t>pygame.display.flip()</a:t>
+            </a:r>
+          </a:p>
+          <a:p>
+            <a:r>
+              <a:rPr lang="en-US" dirty="0"/>
+              <a:t>p</a:t>
+            </a:r>
+            <a:r>
+              <a:rPr lang="en-US" dirty="0" smtClean="0"/>
+              <a:t>ygame.quit()</a:t>
+            </a:r>
+            <a:endParaRPr lang="en-US" dirty="0"/>
           </a:p>
         </p:txBody>
       </p:sp>
     </p:spTree>
+    <p:extLst>
+      <p:ext uri="{BB962C8B-B14F-4D97-AF65-F5344CB8AC3E}">
+        <p14:creationId xmlns:p14="http://schemas.microsoft.com/office/powerpoint/2010/main" val="1322363660"/>
+      </p:ext>
+    </p:extLst>
   </p:cSld>
   <p:clrMapOvr>
     <a:masterClrMapping/>
   </p:clrMapOvr>
-  <p:transition/>
   <p:timing>
     <p:tnLst>
       <p:par>
@@ -6129,7 +6047,7 @@
       </p:grpSpPr>
       <p:sp>
         <p:nvSpPr>
-          <p:cNvPr id="2" name="Title 1"/>
+          <p:cNvPr id="7170" name="Title 1"/>
           <p:cNvSpPr>
             <a:spLocks noGrp="1"/>
           </p:cNvSpPr>
@@ -6144,15 +6062,14 @@
           <a:p>
             <a:r>
               <a:rPr lang="en-US" dirty="0" smtClean="0"/>
-              <a:t>Things to Remember</a:t>
-            </a:r>
-            <a:endParaRPr lang="en-US" dirty="0"/>
-          </a:p>
-        </p:txBody>
-      </p:sp>
-      <p:sp>
-        <p:nvSpPr>
-          <p:cNvPr id="3" name="Content Placeholder 2"/>
+              <a:t>Demos</a:t>
+            </a:r>
+          </a:p>
+        </p:txBody>
+      </p:sp>
+      <p:sp>
+        <p:nvSpPr>
+          <p:cNvPr id="7171" name="Content Placeholder 2"/>
           <p:cNvSpPr>
             <a:spLocks noGrp="1"/>
           </p:cNvSpPr>
@@ -6166,144 +6083,16 @@
           <a:lstStyle/>
           <a:p>
             <a:r>
-              <a:rPr lang="en-US" dirty="0"/>
-              <a:t>i</a:t>
-            </a:r>
-            <a:r>
               <a:rPr lang="en-US" dirty="0" smtClean="0"/>
-              <a:t>mport pygame</a:t>
-            </a:r>
-          </a:p>
-          <a:p>
-            <a:r>
-              <a:rPr lang="en-US" dirty="0"/>
-              <a:t>f</a:t>
-            </a:r>
-            <a:r>
-              <a:rPr lang="en-US" dirty="0" smtClean="0"/>
-              <a:t>rom pygame.locals import *</a:t>
-            </a:r>
-          </a:p>
-          <a:p>
-            <a:r>
-              <a:rPr lang="en-US" dirty="0" smtClean="0"/>
-              <a:t>pygame.init()</a:t>
-            </a:r>
-          </a:p>
-          <a:p>
-            <a:r>
-              <a:rPr lang="en-US" dirty="0" smtClean="0"/>
-              <a:t>Must have event loop</a:t>
-            </a:r>
-          </a:p>
-          <a:p>
-            <a:r>
-              <a:rPr lang="en-US" dirty="0" err="1" smtClean="0"/>
-              <a:t>pygame.display.update</a:t>
-            </a:r>
-            <a:r>
-              <a:rPr lang="en-US" dirty="0" smtClean="0"/>
-              <a:t>() </a:t>
-            </a:r>
-            <a:endParaRPr lang="en-US" dirty="0"/>
-          </a:p>
-          <a:p>
-            <a:r>
-              <a:rPr lang="en-US" dirty="0" smtClean="0"/>
-              <a:t>pygame.display.flip()</a:t>
-            </a:r>
-          </a:p>
-          <a:p>
-            <a:r>
-              <a:rPr lang="en-US" dirty="0"/>
-              <a:t>p</a:t>
-            </a:r>
-            <a:r>
-              <a:rPr lang="en-US" dirty="0" smtClean="0"/>
-              <a:t>ygame.quit()</a:t>
-            </a:r>
-            <a:endParaRPr lang="en-US" dirty="0"/>
-          </a:p>
-        </p:txBody>
-      </p:sp>
-    </p:spTree>
-    <p:extLst>
-      <p:ext uri="{BB962C8B-B14F-4D97-AF65-F5344CB8AC3E}">
-        <p14:creationId xmlns:p14="http://schemas.microsoft.com/office/powerpoint/2010/main" val="1322363660"/>
-      </p:ext>
-    </p:extLst>
-  </p:cSld>
-  <p:clrMapOvr>
-    <a:masterClrMapping/>
-  </p:clrMapOvr>
-  <p:timing>
-    <p:tnLst>
-      <p:par>
-        <p:cTn id="1" dur="indefinite" restart="never" nodeType="tmRoot"/>
-      </p:par>
-    </p:tnLst>
-  </p:timing>
-</p:sld>
-</file>
-
-<file path=ppt/slides/slide12.xml><?xml version="1.0" encoding="utf-8"?>
-<p:sld xmlns:a="http://schemas.openxmlformats.org/drawingml/2006/main" xmlns:r="http://schemas.openxmlformats.org/officeDocument/2006/relationships" xmlns:p="http://schemas.openxmlformats.org/presentationml/2006/main">
-  <p:cSld>
-    <p:spTree>
-      <p:nvGrpSpPr>
-        <p:cNvPr id="1" name=""/>
-        <p:cNvGrpSpPr/>
-        <p:nvPr/>
-      </p:nvGrpSpPr>
-      <p:grpSpPr>
-        <a:xfrm>
-          <a:off x="0" y="0"/>
-          <a:ext cx="0" cy="0"/>
-          <a:chOff x="0" y="0"/>
-          <a:chExt cx="0" cy="0"/>
-        </a:xfrm>
-      </p:grpSpPr>
-      <p:sp>
-        <p:nvSpPr>
-          <p:cNvPr id="7170" name="Title 1"/>
-          <p:cNvSpPr>
-            <a:spLocks noGrp="1"/>
-          </p:cNvSpPr>
-          <p:nvPr>
-            <p:ph type="title"/>
-          </p:nvPr>
-        </p:nvSpPr>
-        <p:spPr/>
-        <p:txBody>
-          <a:bodyPr/>
-          <a:lstStyle/>
-          <a:p>
-            <a:r>
-              <a:rPr lang="en-US" dirty="0" smtClean="0"/>
-              <a:t>Demos</a:t>
-            </a:r>
-          </a:p>
-        </p:txBody>
-      </p:sp>
-      <p:sp>
-        <p:nvSpPr>
-          <p:cNvPr id="7171" name="Content Placeholder 2"/>
-          <p:cNvSpPr>
-            <a:spLocks noGrp="1"/>
-          </p:cNvSpPr>
-          <p:nvPr>
-            <p:ph idx="1"/>
-          </p:nvPr>
-        </p:nvSpPr>
-        <p:spPr/>
-        <p:txBody>
-          <a:bodyPr/>
-          <a:lstStyle/>
+              <a:t>Bubble Trouble </a:t>
+            </a:r>
+          </a:p>
           <a:p>
             <a:r>
               <a:rPr lang="en-US" dirty="0" smtClean="0"/>
               <a:t>Rainfall</a:t>
             </a:r>
+            <a:endParaRPr lang="en-US" dirty="0" smtClean="0"/>
           </a:p>
           <a:p>
             <a:r>
@@ -6347,155 +6136,6 @@
       </p:grpSpPr>
       <p:sp>
         <p:nvSpPr>
-          <p:cNvPr id="4098" name="Rectangle 2"/>
-          <p:cNvSpPr>
-            <a:spLocks noGrp="1" noChangeArrowheads="1"/>
-          </p:cNvSpPr>
-          <p:nvPr>
-            <p:ph type="title"/>
-          </p:nvPr>
-        </p:nvSpPr>
-        <p:spPr>
-          <a:xfrm>
-            <a:off x="152400" y="228600"/>
-            <a:ext cx="7315200" cy="1036638"/>
-          </a:xfrm>
-        </p:spPr>
-        <p:txBody>
-          <a:bodyPr/>
-          <a:lstStyle/>
-          <a:p>
-            <a:pPr eaLnBrk="1" hangingPunct="1"/>
-            <a:r>
-              <a:rPr lang="en-US" sz="4400" dirty="0" smtClean="0"/>
-              <a:t>Pygame</a:t>
-            </a:r>
-            <a:endParaRPr lang="en-US" sz="1100" dirty="0" smtClean="0"/>
-          </a:p>
-        </p:txBody>
-      </p:sp>
-      <p:sp>
-        <p:nvSpPr>
-          <p:cNvPr id="4099" name="Rectangle 3"/>
-          <p:cNvSpPr>
-            <a:spLocks noGrp="1" noChangeArrowheads="1"/>
-          </p:cNvSpPr>
-          <p:nvPr>
-            <p:ph type="body" idx="1"/>
-          </p:nvPr>
-        </p:nvSpPr>
-        <p:spPr>
-          <a:xfrm>
-            <a:off x="533400" y="1265238"/>
-            <a:ext cx="7467600" cy="4876800"/>
-          </a:xfrm>
-        </p:spPr>
-        <p:txBody>
-          <a:bodyPr/>
-          <a:lstStyle/>
-          <a:p>
-            <a:pPr eaLnBrk="1" hangingPunct="1">
-              <a:buFont typeface="Wingdings" pitchFamily="2" charset="2"/>
-              <a:buNone/>
-            </a:pPr>
-            <a:r>
-              <a:rPr lang="en-US" dirty="0" smtClean="0"/>
-              <a:t>Pygame is a library designed for</a:t>
-            </a:r>
-            <a:br>
-              <a:rPr lang="en-US" dirty="0" smtClean="0"/>
-            </a:br>
-            <a:r>
-              <a:rPr lang="en-US" dirty="0" smtClean="0"/>
-              <a:t>programming games using 2D graphics.</a:t>
-            </a:r>
-          </a:p>
-          <a:p>
-            <a:pPr eaLnBrk="1" hangingPunct="1">
-              <a:buFont typeface="Wingdings" pitchFamily="2" charset="2"/>
-              <a:buNone/>
-            </a:pPr>
-            <a:r>
-              <a:rPr lang="en-US" dirty="0" smtClean="0"/>
-              <a:t>Compared to zellegraphics, it has:</a:t>
-            </a:r>
-          </a:p>
-          <a:p>
-            <a:pPr lvl="1" eaLnBrk="1" hangingPunct="1"/>
-            <a:r>
-              <a:rPr lang="en-US" dirty="0" smtClean="0"/>
-              <a:t>much better mouse and keyboard input</a:t>
-            </a:r>
-          </a:p>
-          <a:p>
-            <a:pPr lvl="1" eaLnBrk="1" hangingPunct="1"/>
-            <a:r>
-              <a:rPr lang="en-US" dirty="0" smtClean="0"/>
-              <a:t>much faster drawing commands </a:t>
-            </a:r>
-          </a:p>
-          <a:p>
-            <a:pPr lvl="1" eaLnBrk="1" hangingPunct="1"/>
-            <a:r>
-              <a:rPr lang="en-US" dirty="0" smtClean="0"/>
-              <a:t>better image support</a:t>
-            </a:r>
-          </a:p>
-          <a:p>
-            <a:pPr lvl="1" eaLnBrk="1" hangingPunct="1"/>
-            <a:r>
-              <a:rPr lang="en-US" dirty="0" smtClean="0"/>
-              <a:t>collision-detection</a:t>
-            </a:r>
-          </a:p>
-          <a:p>
-            <a:pPr lvl="1" eaLnBrk="1" hangingPunct="1"/>
-            <a:r>
-              <a:rPr lang="en-US" dirty="0"/>
-              <a:t>s</a:t>
-            </a:r>
-            <a:r>
-              <a:rPr lang="en-US" dirty="0" smtClean="0"/>
-              <a:t>ound</a:t>
-            </a:r>
-          </a:p>
-        </p:txBody>
-      </p:sp>
-    </p:spTree>
-  </p:cSld>
-  <p:clrMapOvr>
-    <a:masterClrMapping/>
-  </p:clrMapOvr>
-  <p:transition/>
-  <p:timing>
-    <p:tnLst>
-      <p:par>
-        <p:cTn id="1" dur="indefinite" restart="never" nodeType="tmRoot"/>
-      </p:par>
-    </p:tnLst>
-  </p:timing>
-</p:sld>
-</file>
-
-<file path=ppt/slides/slide3.xml><?xml version="1.0" encoding="utf-8"?>
-<p:sld xmlns:a="http://schemas.openxmlformats.org/drawingml/2006/main" xmlns:r="http://schemas.openxmlformats.org/officeDocument/2006/relationships" xmlns:p="http://schemas.openxmlformats.org/presentationml/2006/main">
-  <p:cSld>
-    <p:spTree>
-      <p:nvGrpSpPr>
-        <p:cNvPr id="1" name=""/>
-        <p:cNvGrpSpPr/>
-        <p:nvPr/>
-      </p:nvGrpSpPr>
-      <p:grpSpPr>
-        <a:xfrm>
-          <a:off x="0" y="0"/>
-          <a:ext cx="0" cy="0"/>
-          <a:chOff x="0" y="0"/>
-          <a:chExt cx="0" cy="0"/>
-        </a:xfrm>
-      </p:grpSpPr>
-      <p:sp>
-        <p:nvSpPr>
           <p:cNvPr id="2" name="Title 1"/>
           <p:cNvSpPr>
             <a:spLocks noGrp="1"/>
@@ -6543,33 +6183,54 @@
           <a:lstStyle/>
           <a:p>
             <a:r>
-              <a:rPr lang="en-US" dirty="0">
+              <a:rPr lang="en-US" sz="2400" dirty="0" smtClean="0"/>
+              <a:t>PyGame </a:t>
+            </a:r>
+            <a:r>
+              <a:rPr lang="en-US" sz="2400" dirty="0"/>
+              <a:t>is a library designed for</a:t>
+            </a:r>
+            <a:br>
+              <a:rPr lang="en-US" sz="2400" dirty="0"/>
+            </a:br>
+            <a:r>
+              <a:rPr lang="en-US" sz="2400" dirty="0"/>
+              <a:t>programming games using 2D graphics</a:t>
+            </a:r>
+            <a:r>
+              <a:rPr lang="en-US" sz="2400" dirty="0" smtClean="0"/>
+              <a:t>.</a:t>
+            </a:r>
+          </a:p>
+          <a:p>
+            <a:r>
+              <a:rPr lang="en-US" sz="2400" dirty="0">
                 <a:hlinkClick r:id="rId2"/>
               </a:rPr>
               <a:t>http://</a:t>
             </a:r>
             <a:r>
-              <a:rPr lang="en-US" dirty="0" smtClean="0">
+              <a:rPr lang="en-US" sz="2400" dirty="0" smtClean="0">
                 <a:hlinkClick r:id="rId2"/>
               </a:rPr>
               <a:t>www.pygame.org/docs</a:t>
             </a:r>
-            <a:endParaRPr lang="en-US" dirty="0" smtClean="0"/>
-          </a:p>
-          <a:p>
-            <a:r>
-              <a:rPr lang="en-US" dirty="0" smtClean="0"/>
-              <a:t> Everything you need to know about </a:t>
-            </a:r>
-            <a:r>
-              <a:rPr lang="en-US" dirty="0" err="1" smtClean="0"/>
-              <a:t>PyGame</a:t>
-            </a:r>
-            <a:r>
-              <a:rPr lang="en-US" dirty="0" smtClean="0"/>
-              <a:t> can be found here!</a:t>
-            </a:r>
-            <a:endParaRPr lang="en-US" dirty="0"/>
+            <a:endParaRPr lang="en-US" sz="2400" dirty="0" smtClean="0"/>
+          </a:p>
+          <a:p>
+            <a:r>
+              <a:rPr lang="en-US" sz="2400" dirty="0" smtClean="0"/>
+              <a:t>Everything </a:t>
+            </a:r>
+            <a:r>
+              <a:rPr lang="en-US" sz="2400" dirty="0" smtClean="0"/>
+              <a:t>you need to know about PyGame can be found here</a:t>
+            </a:r>
+            <a:r>
+              <a:rPr lang="en-US" sz="2400" dirty="0" smtClean="0"/>
+              <a:t>!</a:t>
+            </a:r>
+            <a:endParaRPr lang="en-US" sz="2400" dirty="0"/>
           </a:p>
         </p:txBody>
       </p:sp>
@@ -6596,8 +6257,8 @@
         </p:blipFill>
         <p:spPr bwMode="auto">
           <a:xfrm>
-            <a:off x="1828800" y="3048000"/>
-            <a:ext cx="5524611" cy="3380123"/>
+            <a:off x="2209800" y="3429000"/>
+            <a:ext cx="4777345" cy="2922923"/>
           </a:xfrm>
           <a:prstGeom prst="rect">
             <a:avLst/>
@@ -6657,7 +6318,7 @@
 </p:sld>
 </file>
 
-<file path=ppt/slides/slide4.xml><?xml version="1.0" encoding="utf-8"?>
+<file path=ppt/slides/slide3.xml><?xml version="1.0" encoding="utf-8"?>
 <p:sld xmlns:a="http://schemas.openxmlformats.org/drawingml/2006/main" xmlns:r="http://schemas.openxmlformats.org/officeDocument/2006/relationships" xmlns:p="http://schemas.openxmlformats.org/presentationml/2006/main">
   <p:cSld>
     <p:spTree>
@@ -6763,7 +6424,7 @@
 </p:sld>
 </file>
 
-<file path=ppt/slides/slide5.xml><?xml version="1.0" encoding="utf-8"?>
+<file path=ppt/slides/slide4.xml><?xml version="1.0" encoding="utf-8"?>
 <p:sld xmlns:a="http://schemas.openxmlformats.org/drawingml/2006/main" xmlns:r="http://schemas.openxmlformats.org/officeDocument/2006/relationships" xmlns:p="http://schemas.openxmlformats.org/presentationml/2006/main">
   <p:cSld>
     <p:spTree>
@@ -7192,6 +6853,238 @@
 </p:sld>
 </file>
 
+<file path=ppt/slides/slide5.xml><?xml version="1.0" encoding="utf-8"?>
+<p:sld xmlns:a="http://schemas.openxmlformats.org/drawingml/2006/main" xmlns:r="http://schemas.openxmlformats.org/officeDocument/2006/relationships" xmlns:p="http://schemas.openxmlformats.org/presentationml/2006/main">
+  <p:cSld>
+    <p:spTree>
+      <p:nvGrpSpPr>
+        <p:cNvPr id="1" name=""/>
+        <p:cNvGrpSpPr/>
+        <p:nvPr/>
+      </p:nvGrpSpPr>
+      <p:grpSpPr>
+        <a:xfrm>
+          <a:off x="0" y="0"/>
+          <a:ext cx="0" cy="0"/>
+          <a:chOff x="0" y="0"/>
+          <a:chExt cx="0" cy="0"/>
+        </a:xfrm>
+      </p:grpSpPr>
+      <p:sp>
+        <p:nvSpPr>
+          <p:cNvPr id="4098" name="Rectangle 2"/>
+          <p:cNvSpPr>
+            <a:spLocks noGrp="1" noChangeArrowheads="1"/>
+          </p:cNvSpPr>
+          <p:nvPr>
+            <p:ph type="title"/>
+          </p:nvPr>
+        </p:nvSpPr>
+        <p:spPr>
+          <a:xfrm>
+            <a:off x="152400" y="381000"/>
+            <a:ext cx="7315200" cy="1036638"/>
+          </a:xfrm>
+        </p:spPr>
+        <p:txBody>
+          <a:bodyPr/>
+          <a:lstStyle/>
+          <a:p>
+            <a:pPr eaLnBrk="1" hangingPunct="1">
+              <a:defRPr/>
+            </a:pPr>
+            <a:r>
+              <a:rPr lang="en-US" sz="4000" dirty="0" smtClean="0"/>
+              <a:t>Moving objects on </a:t>
+            </a:r>
+            <a:br>
+              <a:rPr lang="en-US" sz="4000" dirty="0" smtClean="0"/>
+            </a:br>
+            <a:r>
+              <a:rPr lang="en-US" sz="4000" dirty="0" smtClean="0"/>
+              <a:t>screen in PyGame</a:t>
+            </a:r>
+            <a:endParaRPr lang="en-US" sz="4000" dirty="0"/>
+          </a:p>
+        </p:txBody>
+      </p:sp>
+      <p:sp>
+        <p:nvSpPr>
+          <p:cNvPr id="5123" name="Rectangle 3"/>
+          <p:cNvSpPr>
+            <a:spLocks noGrp="1" noChangeArrowheads="1"/>
+          </p:cNvSpPr>
+          <p:nvPr>
+            <p:ph type="body" idx="1"/>
+          </p:nvPr>
+        </p:nvSpPr>
+        <p:spPr>
+          <a:xfrm>
+            <a:off x="381000" y="1600200"/>
+            <a:ext cx="7467600" cy="4876800"/>
+          </a:xfrm>
+        </p:spPr>
+        <p:txBody>
+          <a:bodyPr/>
+          <a:lstStyle/>
+          <a:p>
+            <a:pPr eaLnBrk="1" hangingPunct="1">
+              <a:buFont typeface="Wingdings" pitchFamily="2" charset="2"/>
+              <a:buNone/>
+            </a:pPr>
+            <a:r>
+              <a:rPr lang="en-US" sz="2300" dirty="0" smtClean="0"/>
+              <a:t>To move an object </a:t>
+            </a:r>
+            <a:r>
+              <a:rPr lang="en-US" sz="2300" dirty="0" err="1" smtClean="0"/>
+              <a:t>Pygame</a:t>
+            </a:r>
+            <a:r>
+              <a:rPr lang="en-US" sz="2300" dirty="0" smtClean="0"/>
+              <a:t>, you repeatedly:</a:t>
+            </a:r>
+          </a:p>
+          <a:p>
+            <a:pPr eaLnBrk="1" hangingPunct="1">
+              <a:buFont typeface="Wingdings" pitchFamily="2" charset="2"/>
+              <a:buNone/>
+            </a:pPr>
+            <a:r>
+              <a:rPr lang="en-US" sz="2300" dirty="0" smtClean="0"/>
+              <a:t>	Change the coordinates of your object </a:t>
+            </a:r>
+          </a:p>
+          <a:p>
+            <a:pPr eaLnBrk="1" hangingPunct="1">
+              <a:buFont typeface="Wingdings" pitchFamily="2" charset="2"/>
+              <a:buNone/>
+            </a:pPr>
+            <a:r>
+              <a:rPr lang="en-US" sz="2300" dirty="0" smtClean="0"/>
+              <a:t>	Blank out the screen </a:t>
+            </a:r>
+          </a:p>
+          <a:p>
+            <a:pPr eaLnBrk="1" hangingPunct="1">
+              <a:buFont typeface="Wingdings" pitchFamily="2" charset="2"/>
+              <a:buNone/>
+            </a:pPr>
+            <a:r>
+              <a:rPr lang="en-US" sz="2300" dirty="0" smtClean="0"/>
+              <a:t>	Redraw your item(s) in the new location – Like </a:t>
+            </a:r>
+          </a:p>
+          <a:p>
+            <a:pPr eaLnBrk="1" hangingPunct="1">
+              <a:buFont typeface="Wingdings" pitchFamily="2" charset="2"/>
+              <a:buNone/>
+            </a:pPr>
+            <a:r>
+              <a:rPr lang="en-US" sz="2300" dirty="0" smtClean="0"/>
+              <a:t>	calling draw()/</a:t>
+            </a:r>
+            <a:r>
+              <a:rPr lang="en-US" sz="2300" dirty="0" err="1" smtClean="0"/>
+              <a:t>blit</a:t>
+            </a:r>
+            <a:r>
+              <a:rPr lang="en-US" sz="2300" dirty="0" smtClean="0"/>
+              <a:t>() (draw() for built-in </a:t>
+            </a:r>
+            <a:r>
+              <a:rPr lang="en-US" sz="2300" dirty="0" err="1" smtClean="0"/>
+              <a:t>PyGame</a:t>
+            </a:r>
+            <a:r>
+              <a:rPr lang="en-US" sz="2300" dirty="0" smtClean="0"/>
+              <a:t> graphics and </a:t>
+            </a:r>
+            <a:r>
+              <a:rPr lang="en-US" sz="2300" dirty="0" err="1" smtClean="0"/>
+              <a:t>blit</a:t>
+            </a:r>
+            <a:r>
+              <a:rPr lang="en-US" sz="2300" dirty="0" smtClean="0"/>
+              <a:t>() for Surfaces)</a:t>
+            </a:r>
+          </a:p>
+          <a:p>
+            <a:pPr eaLnBrk="1" hangingPunct="1">
+              <a:buFont typeface="Wingdings" pitchFamily="2" charset="2"/>
+              <a:buNone/>
+            </a:pPr>
+            <a:r>
+              <a:rPr lang="en-US" sz="2300" dirty="0"/>
+              <a:t> </a:t>
+            </a:r>
+            <a:r>
+              <a:rPr lang="en-US" sz="2300" dirty="0" smtClean="0"/>
+              <a:t>   Update your display</a:t>
+            </a:r>
+            <a:endParaRPr lang="en-US" sz="2300" dirty="0"/>
+          </a:p>
+          <a:p>
+            <a:pPr eaLnBrk="1" hangingPunct="1">
+              <a:buFont typeface="Wingdings" pitchFamily="2" charset="2"/>
+              <a:buNone/>
+            </a:pPr>
+            <a:endParaRPr lang="en-US" sz="2300" dirty="0" smtClean="0"/>
+          </a:p>
+          <a:p>
+            <a:pPr eaLnBrk="1" hangingPunct="1">
+              <a:buFont typeface="Wingdings" pitchFamily="2" charset="2"/>
+              <a:buNone/>
+            </a:pPr>
+            <a:r>
+              <a:rPr lang="en-US" sz="2300" dirty="0" smtClean="0"/>
+              <a:t>This is done in </a:t>
+            </a:r>
+            <a:r>
+              <a:rPr lang="en-US" sz="2300" dirty="0" smtClean="0"/>
+              <a:t>your program’s</a:t>
+            </a:r>
+            <a:r>
+              <a:rPr lang="en-US" sz="2300" dirty="0" smtClean="0"/>
+              <a:t> </a:t>
+            </a:r>
+            <a:r>
+              <a:rPr lang="en-US" sz="2300" b="1" dirty="0" smtClean="0"/>
+              <a:t>event loop</a:t>
+            </a:r>
+            <a:r>
+              <a:rPr lang="en-US" sz="2300" dirty="0" smtClean="0"/>
+              <a:t> (next slide)</a:t>
+            </a:r>
+          </a:p>
+          <a:p>
+            <a:pPr eaLnBrk="1" hangingPunct="1">
+              <a:buFont typeface="Wingdings" pitchFamily="2" charset="2"/>
+              <a:buNone/>
+            </a:pPr>
+            <a:r>
+              <a:rPr lang="en-US" dirty="0" smtClean="0"/>
+              <a:t>	</a:t>
+            </a:r>
+          </a:p>
+        </p:txBody>
+      </p:sp>
+    </p:spTree>
+  </p:cSld>
+  <p:clrMapOvr>
+    <a:masterClrMapping/>
+  </p:clrMapOvr>
+  <p:transition/>
+  <p:timing>
+    <p:tnLst>
+      <p:par>
+        <p:cTn id="1" dur="indefinite" restart="never" nodeType="tmRoot"/>
+      </p:par>
+    </p:tnLst>
+  </p:timing>
+</p:sld>
+</file>
+
 <file path=ppt/slides/slide6.xml><?xml version="1.0" encoding="utf-8"?>
 <p:sld xmlns:a="http://schemas.openxmlformats.org/drawingml/2006/main" xmlns:r="http://schemas.openxmlformats.org/officeDocument/2006/relationships" xmlns:p="http://schemas.openxmlformats.org/presentationml/2006/main">
   <p:cSld>
@@ -7234,25 +7127,15 @@
             </a:pPr>
             <a:r>
               <a:rPr lang="en-US" sz="4000" dirty="0" smtClean="0"/>
-              <a:t>Moving objects on </a:t>
-            </a:r>
-            <a:br>
-              <a:rPr lang="en-US" sz="4000" dirty="0" smtClean="0"/>
-            </a:br>
-            <a:r>
-              <a:rPr lang="en-US" sz="4000" dirty="0" smtClean="0"/>
-              <a:t>screen </a:t>
-            </a:r>
-            <a:r>
-              <a:rPr lang="en-US" sz="4000" dirty="0"/>
-              <a:t>is much different</a:t>
-            </a:r>
-          </a:p>
-        </p:txBody>
-      </p:sp>
-      <p:sp>
-        <p:nvSpPr>
-          <p:cNvPr id="5123" name="Rectangle 3"/>
+              <a:t>Event Loop</a:t>
+            </a:r>
+            <a:endParaRPr lang="en-US" sz="1050" dirty="0" smtClean="0"/>
+          </a:p>
+        </p:txBody>
+      </p:sp>
+      <p:sp>
+        <p:nvSpPr>
+          <p:cNvPr id="4099" name="Rectangle 3"/>
           <p:cNvSpPr>
             <a:spLocks noGrp="1" noChangeArrowheads="1"/>
           </p:cNvSpPr>
@@ -7262,7 +7145,7 @@
         </p:nvSpPr>
         <p:spPr>
           <a:xfrm>
-            <a:off x="381000" y="1600200"/>
+            <a:off x="381000" y="1417638"/>
             <a:ext cx="7467600" cy="4876800"/>
           </a:xfrm>
         </p:spPr>
@@ -7273,147 +7156,126 @@
             <a:pPr eaLnBrk="1" hangingPunct="1">
               <a:buFont typeface="Wingdings" pitchFamily="2" charset="2"/>
               <a:buNone/>
+              <a:defRPr/>
             </a:pPr>
             <a:r>
-              <a:rPr lang="en-US" sz="2300" dirty="0" smtClean="0"/>
-              <a:t>With zellegraphics, you could do things like </a:t>
-            </a:r>
-            <a:r>
-              <a:rPr lang="en-US" sz="2300" b="1" dirty="0" smtClean="0"/>
-              <a:t>circle. Move(dx, dy)</a:t>
-            </a:r>
+              <a:rPr lang="en-US" dirty="0" smtClean="0"/>
+              <a:t>In an </a:t>
+            </a:r>
+            <a:r>
+              <a:rPr lang="en-US" dirty="0" smtClean="0"/>
+              <a:t>while loop</a:t>
+            </a:r>
+            <a:r>
+              <a:rPr lang="en-US" dirty="0" smtClean="0"/>
+              <a:t>, </a:t>
+            </a:r>
+            <a:endParaRPr lang="en-US" dirty="0" smtClean="0"/>
+          </a:p>
+          <a:p>
+            <a:pPr marL="514350" indent="-514350" eaLnBrk="1" hangingPunct="1">
+              <a:buFont typeface="+mj-lt"/>
+              <a:buAutoNum type="arabicPeriod"/>
+              <a:defRPr/>
+            </a:pPr>
+            <a:r>
+              <a:rPr lang="en-US" dirty="0"/>
+              <a:t>G</a:t>
+            </a:r>
+            <a:r>
+              <a:rPr lang="en-US" dirty="0" smtClean="0"/>
+              <a:t>et </a:t>
+            </a:r>
+            <a:r>
+              <a:rPr lang="en-US" dirty="0" smtClean="0"/>
+              <a:t>input from the user, using it to change the state of your object (like the location)</a:t>
+            </a:r>
+          </a:p>
+          <a:p>
+            <a:pPr marL="514350" indent="-514350" eaLnBrk="1" hangingPunct="1">
+              <a:buFont typeface="+mj-lt"/>
+              <a:buAutoNum type="arabicPeriod"/>
+              <a:defRPr/>
+            </a:pPr>
+            <a:r>
+              <a:rPr lang="en-US" dirty="0"/>
+              <a:t>O</a:t>
+            </a:r>
+            <a:r>
+              <a:rPr lang="en-US" dirty="0" smtClean="0"/>
+              <a:t>ther </a:t>
+            </a:r>
+            <a:r>
+              <a:rPr lang="en-US" dirty="0" smtClean="0"/>
+              <a:t>code that affects objects (like </a:t>
+            </a:r>
+            <a:r>
+              <a:rPr lang="en-US" dirty="0" smtClean="0"/>
+              <a:t>collisions between multiple objects)</a:t>
+            </a:r>
+            <a:endParaRPr lang="en-US" dirty="0" smtClean="0"/>
+          </a:p>
+          <a:p>
+            <a:pPr marL="514350" indent="-514350" eaLnBrk="1" hangingPunct="1">
+              <a:buFont typeface="+mj-lt"/>
+              <a:buAutoNum type="arabicPeriod"/>
+              <a:defRPr/>
+            </a:pPr>
+            <a:r>
+              <a:rPr lang="en-US" dirty="0" smtClean="0"/>
+              <a:t>Bl</a:t>
+            </a:r>
+            <a:r>
+              <a:rPr lang="en-US" dirty="0" smtClean="0"/>
+              <a:t>ank </a:t>
+            </a:r>
+            <a:r>
+              <a:rPr lang="en-US" dirty="0" smtClean="0"/>
+              <a:t>out the screen</a:t>
+            </a:r>
+          </a:p>
+          <a:p>
+            <a:pPr marL="514350" indent="-514350" eaLnBrk="1" hangingPunct="1">
+              <a:buFont typeface="+mj-lt"/>
+              <a:buAutoNum type="arabicPeriod"/>
+              <a:defRPr/>
+            </a:pPr>
+            <a:r>
+              <a:rPr lang="en-US" dirty="0"/>
+              <a:t>R</a:t>
+            </a:r>
+            <a:r>
+              <a:rPr lang="en-US" dirty="0" smtClean="0"/>
+              <a:t>edraw </a:t>
+            </a:r>
+            <a:r>
+              <a:rPr lang="en-US" dirty="0" smtClean="0"/>
+              <a:t>your item(s) in the new location</a:t>
+            </a:r>
+          </a:p>
+          <a:p>
+            <a:pPr marL="514350" indent="-514350" eaLnBrk="1" hangingPunct="1">
+              <a:buFont typeface="+mj-lt"/>
+              <a:buAutoNum type="arabicPeriod"/>
+              <a:defRPr/>
+            </a:pPr>
+            <a:r>
+              <a:rPr lang="en-US" dirty="0"/>
+              <a:t>U</a:t>
+            </a:r>
+            <a:r>
+              <a:rPr lang="en-US" dirty="0" smtClean="0"/>
+              <a:t>pdate the display</a:t>
+            </a:r>
+            <a:endParaRPr lang="en-US" dirty="0" smtClean="0"/>
           </a:p>
           <a:p>
             <a:pPr eaLnBrk="1" hangingPunct="1">
               <a:buFont typeface="Wingdings" pitchFamily="2" charset="2"/>
               <a:buNone/>
+              <a:defRPr/>
             </a:pPr>
-            <a:r>
-              <a:rPr lang="en-US" sz="2300" dirty="0" smtClean="0"/>
-              <a:t>In </a:t>
-            </a:r>
-            <a:r>
-              <a:rPr lang="en-US" sz="2300" dirty="0"/>
-              <a:t>P</a:t>
-            </a:r>
-            <a:r>
-              <a:rPr lang="en-US" sz="2300" dirty="0" smtClean="0"/>
-              <a:t>ygame, you repeatedly:</a:t>
-            </a:r>
-          </a:p>
-          <a:p>
-            <a:pPr eaLnBrk="1" hangingPunct="1">
-              <a:buFont typeface="Wingdings" pitchFamily="2" charset="2"/>
-              <a:buNone/>
-            </a:pPr>
-            <a:r>
-              <a:rPr lang="en-US" sz="2300" dirty="0" smtClean="0"/>
-              <a:t>	Change the coordinates of your object – Like calling move()</a:t>
-            </a:r>
-          </a:p>
-          <a:p>
-            <a:pPr eaLnBrk="1" hangingPunct="1">
-              <a:buFont typeface="Wingdings" pitchFamily="2" charset="2"/>
-              <a:buNone/>
-            </a:pPr>
-            <a:r>
-              <a:rPr lang="en-US" sz="2300" dirty="0" smtClean="0"/>
-              <a:t>	Blank out the screen – Like calling fill()</a:t>
-            </a:r>
-          </a:p>
-          <a:p>
-            <a:pPr eaLnBrk="1" hangingPunct="1">
-              <a:buFont typeface="Wingdings" pitchFamily="2" charset="2"/>
-              <a:buNone/>
-            </a:pPr>
-            <a:r>
-              <a:rPr lang="en-US" sz="2300" dirty="0" smtClean="0"/>
-              <a:t>	Redraw your item(s) in the new location – Like </a:t>
-            </a:r>
-          </a:p>
-          <a:p>
-            <a:pPr eaLnBrk="1" hangingPunct="1">
-              <a:buFont typeface="Wingdings" pitchFamily="2" charset="2"/>
-              <a:buNone/>
-            </a:pPr>
-            <a:r>
-              <a:rPr lang="en-US" sz="2300" dirty="0" smtClean="0"/>
-              <a:t>	calling draw()/</a:t>
-            </a:r>
-            <a:r>
-              <a:rPr lang="en-US" sz="2300" dirty="0" err="1" smtClean="0"/>
-              <a:t>blit</a:t>
-            </a:r>
-            <a:r>
-              <a:rPr lang="en-US" sz="2300" dirty="0" smtClean="0"/>
-              <a:t>() (draw() for built-in </a:t>
-            </a:r>
-            <a:r>
-              <a:rPr lang="en-US" sz="2300" dirty="0" err="1" smtClean="0"/>
-              <a:t>PyGame</a:t>
-            </a:r>
-            <a:r>
-              <a:rPr lang="en-US" sz="2300" dirty="0" smtClean="0"/>
-              <a:t> graphics and </a:t>
-            </a:r>
-            <a:r>
-              <a:rPr lang="en-US" sz="2300" dirty="0" err="1" smtClean="0"/>
-              <a:t>blit</a:t>
-            </a:r>
-            <a:r>
-              <a:rPr lang="en-US" sz="2300" dirty="0" smtClean="0"/>
-              <a:t>() for Surfaces)</a:t>
-            </a:r>
-          </a:p>
-          <a:p>
-            <a:pPr eaLnBrk="1" hangingPunct="1">
-              <a:buFont typeface="Wingdings" pitchFamily="2" charset="2"/>
-              <a:buNone/>
-            </a:pPr>
-            <a:r>
-              <a:rPr lang="en-US" sz="2300" dirty="0"/>
-              <a:t> </a:t>
-            </a:r>
-            <a:r>
-              <a:rPr lang="en-US" sz="2300" dirty="0" smtClean="0"/>
-              <a:t>   Update your display</a:t>
-            </a:r>
-            <a:endParaRPr lang="en-US" sz="2300" dirty="0"/>
-          </a:p>
-          <a:p>
-            <a:pPr eaLnBrk="1" hangingPunct="1">
-              <a:buFont typeface="Wingdings" pitchFamily="2" charset="2"/>
-              <a:buNone/>
-            </a:pPr>
-            <a:endParaRPr lang="en-US" sz="2300" dirty="0" smtClean="0"/>
-          </a:p>
-          <a:p>
-            <a:pPr eaLnBrk="1" hangingPunct="1">
-              <a:buFont typeface="Wingdings" pitchFamily="2" charset="2"/>
-              <a:buNone/>
-            </a:pPr>
-            <a:r>
-              <a:rPr lang="en-US" sz="2300" dirty="0" smtClean="0"/>
-              <a:t>This is done in the </a:t>
-            </a:r>
-            <a:r>
-              <a:rPr lang="en-US" sz="2300" b="1" dirty="0" smtClean="0"/>
-              <a:t>event loop</a:t>
-            </a:r>
-            <a:r>
-              <a:rPr lang="en-US" sz="2300" dirty="0" smtClean="0"/>
-              <a:t> (next slide)</a:t>
-            </a:r>
-          </a:p>
-          <a:p>
-            <a:pPr eaLnBrk="1" hangingPunct="1">
-              <a:buFont typeface="Wingdings" pitchFamily="2" charset="2"/>
-              <a:buNone/>
-            </a:pPr>
-            <a:r>
-              <a:rPr lang="en-US" dirty="0" smtClean="0"/>
-              <a:t>	</a:t>
-            </a:r>
+            <a:endParaRPr lang="en-US" dirty="0" smtClean="0"/>
           </a:p>
         </p:txBody>
       </p:sp>
@@ -7452,136 +7314,171 @@
       </p:grpSpPr>
       <p:sp>
         <p:nvSpPr>
-          <p:cNvPr id="4098" name="Rectangle 2"/>
-          <p:cNvSpPr>
-            <a:spLocks noGrp="1" noChangeArrowheads="1"/>
+          <p:cNvPr id="2" name="Title 1"/>
+          <p:cNvSpPr>
+            <a:spLocks noGrp="1"/>
           </p:cNvSpPr>
           <p:nvPr>
             <p:ph type="title"/>
           </p:nvPr>
         </p:nvSpPr>
-        <p:spPr>
-          <a:xfrm>
-            <a:off x="152400" y="381000"/>
-            <a:ext cx="7315200" cy="1036638"/>
-          </a:xfrm>
-        </p:spPr>
+        <p:spPr/>
         <p:txBody>
           <a:bodyPr/>
           <a:lstStyle/>
           <a:p>
-            <a:pPr eaLnBrk="1" hangingPunct="1">
-              <a:defRPr/>
-            </a:pPr>
             <a:r>
               <a:rPr lang="en-US" sz="4000" dirty="0" smtClean="0"/>
-              <a:t>Event Loop</a:t>
-            </a:r>
-            <a:endParaRPr lang="en-US" sz="1050" dirty="0" smtClean="0"/>
-          </a:p>
-        </p:txBody>
-      </p:sp>
-      <p:sp>
-        <p:nvSpPr>
-          <p:cNvPr id="4099" name="Rectangle 3"/>
-          <p:cNvSpPr>
-            <a:spLocks noGrp="1" noChangeArrowheads="1"/>
-          </p:cNvSpPr>
-          <p:nvPr>
-            <p:ph type="body" idx="1"/>
-          </p:nvPr>
-        </p:nvSpPr>
-        <p:spPr>
-          <a:xfrm>
-            <a:off x="381000" y="1417638"/>
-            <a:ext cx="7467600" cy="4876800"/>
-          </a:xfrm>
-        </p:spPr>
+              <a:t>Event</a:t>
+            </a:r>
+            <a:r>
+              <a:rPr lang="en-US" dirty="0" smtClean="0"/>
+              <a:t> </a:t>
+            </a:r>
+            <a:r>
+              <a:rPr lang="en-US" sz="4000" dirty="0" smtClean="0"/>
+              <a:t>Loop </a:t>
+            </a:r>
+            <a:r>
+              <a:rPr lang="en-US" sz="4000" dirty="0" smtClean="0"/>
+              <a:t>- Example</a:t>
+            </a:r>
+            <a:endParaRPr lang="en-US" dirty="0"/>
+          </a:p>
+        </p:txBody>
+      </p:sp>
+      <p:sp>
+        <p:nvSpPr>
+          <p:cNvPr id="3" name="Content Placeholder 2"/>
+          <p:cNvSpPr>
+            <a:spLocks noGrp="1"/>
+          </p:cNvSpPr>
+          <p:nvPr>
+            <p:ph idx="1"/>
+          </p:nvPr>
+        </p:nvSpPr>
+        <p:spPr/>
         <p:txBody>
           <a:bodyPr/>
           <a:lstStyle/>
           <a:p>
-            <a:pPr eaLnBrk="1" hangingPunct="1">
-              <a:buFont typeface="Wingdings" pitchFamily="2" charset="2"/>
+            <a:r>
+              <a:rPr lang="en-US" dirty="0" smtClean="0"/>
+              <a:t>while True:</a:t>
+            </a:r>
+          </a:p>
+          <a:p>
+            <a:pPr marL="344487" lvl="1" indent="0">
               <a:buNone/>
-              <a:defRPr/>
             </a:pPr>
             <a:r>
               <a:rPr lang="en-US" dirty="0" smtClean="0"/>
-              <a:t>In an infinite loop, </a:t>
-            </a:r>
-          </a:p>
-          <a:p>
-            <a:pPr marL="514350" indent="-514350" eaLnBrk="1" hangingPunct="1">
-              <a:buFont typeface="+mj-lt"/>
-              <a:buAutoNum type="arabicPeriod"/>
-              <a:defRPr/>
+              <a:t>	events = pygame.event.get()</a:t>
+            </a:r>
+          </a:p>
+          <a:p>
+            <a:pPr marL="344487" lvl="1" indent="0">
+              <a:buNone/>
             </a:pPr>
             <a:r>
+              <a:rPr lang="en-US" dirty="0"/>
+              <a:t>	</a:t>
+            </a:r>
+            <a:r>
               <a:rPr lang="en-US" dirty="0" smtClean="0"/>
-              <a:t>get input from the user, using it to change the state of your object (like the location)</a:t>
-            </a:r>
-          </a:p>
-          <a:p>
-            <a:pPr marL="514350" indent="-514350" eaLnBrk="1" hangingPunct="1">
-              <a:buFont typeface="+mj-lt"/>
-              <a:buAutoNum type="arabicPeriod"/>
-              <a:defRPr/>
+              <a:t>for event in events:</a:t>
+            </a:r>
+          </a:p>
+          <a:p>
+            <a:pPr marL="344487" lvl="1" indent="0">
+              <a:buNone/>
             </a:pPr>
             <a:r>
+              <a:rPr lang="en-US" dirty="0"/>
+              <a:t>		</a:t>
+            </a:r>
+            <a:r>
               <a:rPr lang="en-US" dirty="0" smtClean="0"/>
-              <a:t>other code that affects objects (like collisions)</a:t>
-            </a:r>
-          </a:p>
-          <a:p>
-            <a:pPr marL="514350" indent="-514350" eaLnBrk="1" hangingPunct="1">
-              <a:buFont typeface="+mj-lt"/>
-              <a:buAutoNum type="arabicPeriod"/>
-              <a:defRPr/>
+              <a:t>if event.type = QUIT:</a:t>
+            </a:r>
+          </a:p>
+          <a:p>
+            <a:pPr marL="344487" lvl="1" indent="0">
+              <a:buNone/>
             </a:pPr>
             <a:r>
+              <a:rPr lang="en-US" dirty="0"/>
+              <a:t>	</a:t>
+            </a:r>
+            <a:r>
               <a:rPr lang="en-US" dirty="0" smtClean="0"/>
-              <a:t>blank out the screen</a:t>
-            </a:r>
-          </a:p>
-          <a:p>
-            <a:pPr marL="514350" indent="-514350" eaLnBrk="1" hangingPunct="1">
-              <a:buFont typeface="+mj-lt"/>
-              <a:buAutoNum type="arabicPeriod"/>
-              <a:defRPr/>
+              <a:t>		… </a:t>
+            </a:r>
+          </a:p>
+          <a:p>
+            <a:pPr marL="344487" lvl="1" indent="0">
+              <a:buNone/>
             </a:pPr>
             <a:r>
+              <a:rPr lang="en-US" dirty="0"/>
+              <a:t> </a:t>
+            </a:r>
+            <a:r>
               <a:rPr lang="en-US" dirty="0" smtClean="0"/>
-              <a:t>redraw your item(s) in the new location</a:t>
-            </a:r>
-          </a:p>
-          <a:p>
-            <a:pPr marL="514350" indent="-514350" eaLnBrk="1" hangingPunct="1">
-              <a:buFont typeface="+mj-lt"/>
-              <a:buAutoNum type="arabicPeriod"/>
-              <a:defRPr/>
+              <a:t>     // collision detection, other event handling code </a:t>
+            </a:r>
+          </a:p>
+          <a:p>
+            <a:pPr marL="344487" lvl="1" indent="0">
+              <a:buNone/>
             </a:pPr>
             <a:r>
+              <a:rPr lang="en-US" dirty="0"/>
+              <a:t> </a:t>
+            </a:r>
+            <a:r>
               <a:rPr lang="en-US" dirty="0" smtClean="0"/>
-              <a:t>cause everything to display</a:t>
-            </a:r>
-          </a:p>
-          <a:p>
-            <a:pPr eaLnBrk="1" hangingPunct="1">
-              <a:buFont typeface="Wingdings" pitchFamily="2" charset="2"/>
+              <a:t>     // blank out screen</a:t>
+            </a:r>
+          </a:p>
+          <a:p>
+            <a:pPr marL="344487" lvl="1" indent="0">
               <a:buNone/>
-              <a:defRPr/>
             </a:pPr>
-            <a:endParaRPr lang="en-US" dirty="0" smtClean="0"/>
+            <a:r>
+              <a:rPr lang="en-US" dirty="0"/>
+              <a:t> </a:t>
+            </a:r>
+            <a:r>
+              <a:rPr lang="en-US" dirty="0" smtClean="0"/>
+              <a:t>     // redraw objects</a:t>
+            </a:r>
+          </a:p>
+          <a:p>
+            <a:pPr marL="344487" lvl="1" indent="0">
+              <a:buNone/>
+            </a:pPr>
+            <a:r>
+              <a:rPr lang="en-US" dirty="0"/>
+              <a:t> </a:t>
+            </a:r>
+            <a:r>
+              <a:rPr lang="en-US" dirty="0" smtClean="0"/>
+              <a:t>     // update display</a:t>
+            </a:r>
           </a:p>
         </p:txBody>
       </p:sp>
     </p:spTree>
+    <p:extLst>
+      <p:ext uri="{BB962C8B-B14F-4D97-AF65-F5344CB8AC3E}">
+        <p14:creationId xmlns:p14="http://schemas.microsoft.com/office/powerpoint/2010/main" val="511116040"/>
+      </p:ext>
+    </p:extLst>
   </p:cSld>
   <p:clrMapOvr>
     <a:masterClrMapping/>
   </p:clrMapOvr>
-  <p:transition/>
   <p:timing>
     <p:tnLst>
       <p:par>
@@ -7626,15 +7523,7 @@
           <a:p>
             <a:r>
               <a:rPr lang="en-US" sz="4000" dirty="0" smtClean="0"/>
-              <a:t>Event</a:t>
-            </a:r>
-            <a:r>
-              <a:rPr lang="en-US" dirty="0" smtClean="0"/>
-              <a:t> </a:t>
-            </a:r>
-            <a:r>
-              <a:rPr lang="en-US" sz="4000" dirty="0" smtClean="0"/>
-              <a:t>Loop (cont.)</a:t>
+              <a:t>Colors</a:t>
             </a:r>
             <a:endParaRPr lang="en-US" dirty="0"/>
           </a:p>
@@ -7650,122 +7539,96 @@
             <p:ph idx="1"/>
           </p:nvPr>
         </p:nvSpPr>
-        <p:spPr/>
+        <p:spPr>
+          <a:xfrm>
+            <a:off x="381000" y="1417638"/>
+            <a:ext cx="8229600" cy="3616325"/>
+          </a:xfrm>
+        </p:spPr>
         <p:txBody>
           <a:bodyPr/>
           <a:lstStyle/>
           <a:p>
-            <a:r>
-              <a:rPr lang="en-US" dirty="0" smtClean="0"/>
-              <a:t>while True:</a:t>
-            </a:r>
-          </a:p>
-          <a:p>
-            <a:pPr marL="344487" lvl="1" indent="0">
+            <a:pPr marL="0" indent="0">
               <a:buNone/>
             </a:pPr>
-            <a:r>
-              <a:rPr lang="en-US" dirty="0" smtClean="0"/>
-              <a:t>	events = pygame.event.get()</a:t>
-            </a:r>
-          </a:p>
-          <a:p>
-            <a:pPr marL="344487" lvl="1" indent="0">
-              <a:buNone/>
-            </a:pPr>
-            <a:r>
-              <a:rPr lang="en-US" dirty="0"/>
-              <a:t>	</a:t>
-            </a:r>
-            <a:r>
-              <a:rPr lang="en-US" dirty="0" smtClean="0"/>
-              <a:t>for event in events:</a:t>
-            </a:r>
-          </a:p>
-          <a:p>
-            <a:pPr marL="344487" lvl="1" indent="0">
-              <a:buNone/>
-            </a:pPr>
-            <a:r>
-              <a:rPr lang="en-US" dirty="0"/>
-              <a:t>		</a:t>
-            </a:r>
-            <a:r>
-              <a:rPr lang="en-US" dirty="0" smtClean="0"/>
-              <a:t>if event.type = QUIT:</a:t>
-            </a:r>
-          </a:p>
-          <a:p>
-            <a:pPr marL="344487" lvl="1" indent="0">
-              <a:buNone/>
-            </a:pPr>
-            <a:r>
-              <a:rPr lang="en-US" dirty="0"/>
-              <a:t>	</a:t>
-            </a:r>
-            <a:r>
-              <a:rPr lang="en-US" dirty="0" smtClean="0"/>
-              <a:t>		… </a:t>
-            </a:r>
-          </a:p>
-          <a:p>
-            <a:pPr marL="344487" lvl="1" indent="0">
-              <a:buNone/>
-            </a:pPr>
-            <a:r>
-              <a:rPr lang="en-US" dirty="0"/>
-              <a:t> </a:t>
-            </a:r>
-            <a:r>
-              <a:rPr lang="en-US" dirty="0" smtClean="0"/>
-              <a:t>     // collision detection, other event handling code </a:t>
-            </a:r>
-          </a:p>
-          <a:p>
-            <a:pPr marL="344487" lvl="1" indent="0">
-              <a:buNone/>
-            </a:pPr>
-            <a:r>
-              <a:rPr lang="en-US" dirty="0"/>
-              <a:t> </a:t>
-            </a:r>
-            <a:r>
-              <a:rPr lang="en-US" dirty="0" smtClean="0"/>
-              <a:t>     // blank out screen</a:t>
-            </a:r>
-          </a:p>
-          <a:p>
-            <a:pPr marL="344487" lvl="1" indent="0">
-              <a:buNone/>
-            </a:pPr>
-            <a:r>
-              <a:rPr lang="en-US" dirty="0"/>
-              <a:t> </a:t>
-            </a:r>
-            <a:r>
-              <a:rPr lang="en-US" dirty="0" smtClean="0"/>
-              <a:t>     // redraw objects</a:t>
-            </a:r>
-          </a:p>
-          <a:p>
-            <a:pPr marL="344487" lvl="1" indent="0">
-              <a:buNone/>
-            </a:pPr>
-            <a:r>
-              <a:rPr lang="en-US" dirty="0"/>
-              <a:t> </a:t>
-            </a:r>
-            <a:r>
-              <a:rPr lang="en-US" dirty="0" smtClean="0"/>
-              <a:t>     // update display</a:t>
-            </a:r>
+            <a:endParaRPr lang="en-US" sz="2600" dirty="0" smtClean="0"/>
+          </a:p>
+          <a:p>
+            <a:r>
+              <a:rPr lang="en-US" sz="2600" dirty="0" err="1" smtClean="0"/>
+              <a:t>pygame.Color</a:t>
+            </a:r>
+            <a:r>
+              <a:rPr lang="en-US" sz="2600" dirty="0" smtClean="0"/>
+              <a:t>(</a:t>
+            </a:r>
+            <a:r>
+              <a:rPr lang="en-US" sz="2600" dirty="0" err="1" smtClean="0"/>
+              <a:t>color_name</a:t>
+            </a:r>
+            <a:r>
+              <a:rPr lang="en-US" sz="2600" dirty="0" smtClean="0"/>
+              <a:t>)</a:t>
+            </a:r>
+          </a:p>
+          <a:p>
+            <a:r>
+              <a:rPr lang="en-US" sz="2600" dirty="0" err="1"/>
+              <a:t>c</a:t>
+            </a:r>
+            <a:r>
+              <a:rPr lang="en-US" sz="2600" dirty="0" err="1" smtClean="0"/>
+              <a:t>olor_name</a:t>
+            </a:r>
+            <a:r>
+              <a:rPr lang="en-US" sz="2600" dirty="0" smtClean="0"/>
+              <a:t> is an RGB tuple - (R, G, B) – each value represents the red, green, and blue values of a specific color</a:t>
+            </a:r>
+          </a:p>
+          <a:p>
+            <a:r>
+              <a:rPr lang="en-US" sz="2600" dirty="0" smtClean="0"/>
+              <a:t>Red </a:t>
+            </a:r>
+            <a:r>
+              <a:rPr lang="en-US" sz="2600" dirty="0"/>
+              <a:t>= [255, 0, 0]</a:t>
+            </a:r>
+          </a:p>
+          <a:p>
+            <a:r>
+              <a:rPr lang="en-US" sz="2600" dirty="0" smtClean="0"/>
+              <a:t>Blue = [0, 0, 255]</a:t>
+            </a:r>
+          </a:p>
+          <a:p>
+            <a:r>
+              <a:rPr lang="en-US" sz="2600" dirty="0" smtClean="0"/>
+              <a:t>Lime Green = [50, 205, 50</a:t>
+            </a:r>
+            <a:r>
+              <a:rPr lang="en-US" sz="2600" dirty="0" smtClean="0"/>
+              <a:t>]</a:t>
+            </a:r>
+          </a:p>
+          <a:p>
+            <a:r>
+              <a:rPr lang="en-US" sz="2600" dirty="0" err="1" smtClean="0"/>
+              <a:t>color_name</a:t>
+            </a:r>
+            <a:r>
+              <a:rPr lang="en-US" sz="2600" dirty="0" smtClean="0"/>
+              <a:t> can also be a string like “green” or “gray”</a:t>
+            </a:r>
+            <a:endParaRPr lang="en-US" sz="2600" dirty="0"/>
           </a:p>
         </p:txBody>
       </p:sp>
     </p:spTree>
     <p:extLst>
       <p:ext uri="{BB962C8B-B14F-4D97-AF65-F5344CB8AC3E}">
-        <p14:creationId xmlns:p14="http://schemas.microsoft.com/office/powerpoint/2010/main" val="511116040"/>
+        <p14:creationId xmlns:p14="http://schemas.microsoft.com/office/powerpoint/2010/main" val="3124542073"/>
       </p:ext>
     </p:extLst>
   </p:cSld>
@@ -7801,114 +7664,120 @@
       </p:grpSpPr>
       <p:sp>
         <p:nvSpPr>
-          <p:cNvPr id="2" name="Title 1"/>
-          <p:cNvSpPr>
-            <a:spLocks noGrp="1"/>
+          <p:cNvPr id="4098" name="Rectangle 2"/>
+          <p:cNvSpPr>
+            <a:spLocks noGrp="1" noChangeArrowheads="1"/>
           </p:cNvSpPr>
           <p:nvPr>
             <p:ph type="title"/>
           </p:nvPr>
         </p:nvSpPr>
-        <p:spPr/>
+        <p:spPr>
+          <a:xfrm>
+            <a:off x="152400" y="228600"/>
+            <a:ext cx="7315200" cy="1036638"/>
+          </a:xfrm>
+        </p:spPr>
         <p:txBody>
           <a:bodyPr/>
           <a:lstStyle/>
           <a:p>
-            <a:r>
-              <a:rPr lang="en-US" sz="4000" dirty="0" smtClean="0"/>
-              <a:t>Colors</a:t>
-            </a:r>
-            <a:endParaRPr lang="en-US" dirty="0"/>
-          </a:p>
-        </p:txBody>
-      </p:sp>
-      <p:sp>
-        <p:nvSpPr>
-          <p:cNvPr id="3" name="Content Placeholder 2"/>
-          <p:cNvSpPr>
-            <a:spLocks noGrp="1"/>
-          </p:cNvSpPr>
-          <p:nvPr>
-            <p:ph idx="1"/>
-          </p:nvPr>
-        </p:nvSpPr>
-        <p:spPr/>
+            <a:pPr eaLnBrk="1" hangingPunct="1"/>
+            <a:r>
+              <a:rPr lang="en-US" sz="4400" dirty="0" smtClean="0"/>
+              <a:t>Caution</a:t>
+            </a:r>
+            <a:endParaRPr lang="en-US" sz="1100" dirty="0" smtClean="0"/>
+          </a:p>
+        </p:txBody>
+      </p:sp>
+      <p:sp>
+        <p:nvSpPr>
+          <p:cNvPr id="4099" name="Rectangle 3"/>
+          <p:cNvSpPr>
+            <a:spLocks noGrp="1" noChangeArrowheads="1"/>
+          </p:cNvSpPr>
+          <p:nvPr>
+            <p:ph type="body" idx="1"/>
+          </p:nvPr>
+        </p:nvSpPr>
+        <p:spPr>
+          <a:xfrm>
+            <a:off x="381000" y="1752600"/>
+            <a:ext cx="7467600" cy="4876800"/>
+          </a:xfrm>
+        </p:spPr>
         <p:txBody>
           <a:bodyPr/>
           <a:lstStyle/>
           <a:p>
-            <a:r>
-              <a:rPr lang="en-US" sz="2600" dirty="0" smtClean="0"/>
-              <a:t>Zellegraphics had built in colors: “red”, “blue”, etc.</a:t>
-            </a:r>
-          </a:p>
-          <a:p>
-            <a:r>
-              <a:rPr lang="en-US" sz="2600" dirty="0" err="1" smtClean="0"/>
-              <a:t>pygame.Color</a:t>
-            </a:r>
-            <a:r>
-              <a:rPr lang="en-US" sz="2600" dirty="0" smtClean="0"/>
-              <a:t>(</a:t>
-            </a:r>
-            <a:r>
-              <a:rPr lang="en-US" sz="2600" dirty="0" err="1" smtClean="0"/>
-              <a:t>color_name</a:t>
-            </a:r>
-            <a:r>
-              <a:rPr lang="en-US" sz="2600" dirty="0" smtClean="0"/>
-              <a:t>)</a:t>
-            </a:r>
-          </a:p>
-          <a:p>
-            <a:r>
-              <a:rPr lang="en-US" sz="2600" dirty="0" err="1"/>
-              <a:t>c</a:t>
-            </a:r>
-            <a:r>
-              <a:rPr lang="en-US" sz="2600" dirty="0" err="1" smtClean="0"/>
-              <a:t>olor_name</a:t>
-            </a:r>
-            <a:r>
-              <a:rPr lang="en-US" sz="2600" dirty="0" smtClean="0"/>
-              <a:t> is an RGB tuple - (R, G, B) – each value represents the red, green, and blue values of a specific color</a:t>
-            </a:r>
-          </a:p>
-          <a:p>
-            <a:r>
-              <a:rPr lang="en-US" sz="2600" dirty="0" smtClean="0"/>
-              <a:t>Red </a:t>
-            </a:r>
-            <a:r>
-              <a:rPr lang="en-US" sz="2600" dirty="0"/>
-              <a:t>= [255, 0, 0]</a:t>
-            </a:r>
-          </a:p>
-          <a:p>
-            <a:r>
-              <a:rPr lang="en-US" sz="2600" dirty="0" smtClean="0"/>
-              <a:t>Blue = [0, 0, 255]</a:t>
-            </a:r>
-          </a:p>
-          <a:p>
-            <a:r>
-              <a:rPr lang="en-US" sz="2600" dirty="0" smtClean="0"/>
-              <a:t>Lime Green = [50, 205, 50]</a:t>
-            </a:r>
-            <a:endParaRPr lang="en-US" sz="2600" dirty="0"/>
+            <a:pPr eaLnBrk="1" hangingPunct="1"/>
+            <a:r>
+              <a:rPr lang="en-US" sz="2800" dirty="0" smtClean="0"/>
+              <a:t>At the end of your project, you’ll be given an opportunity </a:t>
+            </a:r>
+            <a:r>
+              <a:rPr lang="en-US" sz="2800" dirty="0" smtClean="0"/>
+              <a:t>to take your project home with you. </a:t>
+            </a:r>
+            <a:r>
+              <a:rPr lang="en-US" sz="2800" dirty="0" smtClean="0"/>
+              <a:t>For this to work, all pygame fonts that you </a:t>
+            </a:r>
+            <a:r>
+              <a:rPr lang="en-US" sz="2800" dirty="0"/>
+              <a:t>use </a:t>
+            </a:r>
+            <a:r>
+              <a:rPr lang="en-US" sz="2800" dirty="0" smtClean="0"/>
+              <a:t>should be </a:t>
+            </a:r>
+            <a:r>
+              <a:rPr lang="en-US" sz="2800" b="1" dirty="0" smtClean="0"/>
+              <a:t>SysFonts</a:t>
+            </a:r>
+            <a:r>
+              <a:rPr lang="en-US" sz="2800" dirty="0" smtClean="0"/>
+              <a:t> (created using pygame.font.SysFont) and the pygame default font should not be used [i.e. don’t use pygame.font.SysFont(None, 12)]</a:t>
+            </a:r>
+            <a:endParaRPr lang="en-US" sz="2800" dirty="0"/>
+          </a:p>
+          <a:p>
+            <a:pPr eaLnBrk="1" hangingPunct="1"/>
+            <a:r>
+              <a:rPr lang="en-US" sz="2800" dirty="0" smtClean="0"/>
+              <a:t>pygame.time keeps time in </a:t>
+            </a:r>
+            <a:r>
+              <a:rPr lang="en-US" sz="2800" b="1" dirty="0" smtClean="0"/>
+              <a:t>milliseconds</a:t>
+            </a:r>
+            <a:r>
+              <a:rPr lang="en-US" sz="2800" dirty="0" smtClean="0"/>
+              <a:t> not </a:t>
+            </a:r>
+            <a:r>
+              <a:rPr lang="en-US" sz="2800" dirty="0" smtClean="0"/>
+              <a:t>seconds vs python’s time library which keeps track of time in </a:t>
+            </a:r>
+            <a:r>
+              <a:rPr lang="en-US" sz="2800" b="1" dirty="0" smtClean="0"/>
+              <a:t>seconds</a:t>
+            </a:r>
+            <a:r>
+              <a:rPr lang="en-US" sz="2800" dirty="0" smtClean="0"/>
+              <a:t> </a:t>
+            </a:r>
+            <a:endParaRPr lang="en-US" sz="2400" dirty="0" smtClean="0"/>
           </a:p>
         </p:txBody>
       </p:sp>
     </p:spTree>
-    <p:extLst>
-      <p:ext uri="{BB962C8B-B14F-4D97-AF65-F5344CB8AC3E}">
-        <p14:creationId xmlns:p14="http://schemas.microsoft.com/office/powerpoint/2010/main" val="3124542073"/>
-      </p:ext>
-    </p:extLst>
   </p:cSld>
   <p:clrMapOvr>
     <a:masterClrMapping/>
   </p:clrMapOvr>
+  <p:transition/>
   <p:timing>
     <p:tnLst>
       <p:par>

</xml_diff>